<commit_message>
Corrige arquitetura de solução
</commit_message>
<xml_diff>
--- a/Documentos/Arquitetura/Arquitetura_MiauDote.pptx
+++ b/Documentos/Arquitetura/Arquitetura_MiauDote.pptx
@@ -218,7 +218,7 @@
             <a:fld id="{C3CD65D1-5C11-455D-9F9A-0E035F00A0DA}" type="datetimeFigureOut">
               <a:rPr lang="pt-BR" smtClean="0"/>
               <a:pPr/>
-              <a:t>12/10/2021</a:t>
+              <a:t>20/10/2021</a:t>
             </a:fld>
             <a:endParaRPr lang="pt-BR" dirty="0"/>
           </a:p>
@@ -285,7 +285,7 @@
             <a:fld id="{CA8E3B7C-E4AE-4E9E-8479-7C668141D483}" type="slidenum">
               <a:rPr lang="pt-BR" smtClean="0"/>
               <a:pPr/>
-              <a:t>‹#›</a:t>
+              <a:t>‹nº›</a:t>
             </a:fld>
             <a:endParaRPr lang="pt-BR" dirty="0"/>
           </a:p>
@@ -386,7 +386,7 @@
             <a:fld id="{A05DA3EF-18EA-43DE-B1BB-402A3C558822}" type="datetimeFigureOut">
               <a:rPr lang="pt-BR" smtClean="0"/>
               <a:pPr/>
-              <a:t>12/10/2021</a:t>
+              <a:t>20/10/2021</a:t>
             </a:fld>
             <a:endParaRPr lang="pt-BR" dirty="0"/>
           </a:p>
@@ -547,7 +547,7 @@
             <a:fld id="{75B3645A-D0AE-4F6E-A17E-E0036A9041AF}" type="slidenum">
               <a:rPr lang="pt-BR" smtClean="0"/>
               <a:pPr/>
-              <a:t>‹#›</a:t>
+              <a:t>‹nº›</a:t>
             </a:fld>
             <a:endParaRPr lang="pt-BR" dirty="0"/>
           </a:p>
@@ -3721,7 +3721,7 @@
               <a:pPr>
                 <a:defRPr/>
               </a:pPr>
-              <a:t>‹#›</a:t>
+              <a:t>‹nº›</a:t>
             </a:fld>
             <a:endParaRPr lang="pt-BR" sz="880" dirty="0"/>
           </a:p>
@@ -20933,7 +20933,7 @@
               <a:pPr>
                 <a:defRPr/>
               </a:pPr>
-              <a:t>‹#›</a:t>
+              <a:t>‹nº›</a:t>
             </a:fld>
             <a:endParaRPr lang="pt-BR" sz="880" dirty="0"/>
           </a:p>
@@ -24086,13 +24086,11 @@
             </p:cNvPr>
             <p:cNvCxnSpPr>
               <a:cxnSpLocks/>
-              <a:stCxn id="116" idx="1"/>
-              <a:endCxn id="104" idx="3"/>
             </p:cNvCxnSpPr>
             <p:nvPr/>
           </p:nvCxnSpPr>
           <p:spPr>
-            <a:xfrm flipH="1" flipV="1">
+            <a:xfrm flipV="1">
               <a:off x="9378241" y="5340886"/>
               <a:ext cx="692936" cy="1"/>
             </a:xfrm>
@@ -24136,15 +24134,13 @@
             </p:cNvPr>
             <p:cNvCxnSpPr>
               <a:cxnSpLocks/>
-              <a:stCxn id="70" idx="3"/>
-              <a:endCxn id="92" idx="1"/>
             </p:cNvCxnSpPr>
             <p:nvPr/>
           </p:nvCxnSpPr>
           <p:spPr>
-            <a:xfrm>
+            <a:xfrm flipH="1">
               <a:off x="2786187" y="4312379"/>
-              <a:ext cx="678438" cy="12244"/>
+              <a:ext cx="678438" cy="0"/>
             </a:xfrm>
             <a:prstGeom prst="straightConnector1">
               <a:avLst/>
@@ -25605,21 +25601,6 @@
 </file>
 
 <file path=customXml/item1.xml><?xml version="1.0" encoding="utf-8"?>
-<p:properties xmlns:p="http://schemas.microsoft.com/office/2006/metadata/properties" xmlns:xsi="http://www.w3.org/2001/XMLSchema-instance" xmlns:pc="http://schemas.microsoft.com/office/infopath/2007/PartnerControls">
-  <documentManagement/>
-</p:properties>
-</file>
-
-<file path=customXml/item2.xml><?xml version="1.0" encoding="utf-8"?>
-<?mso-contentType ?>
-<FormTemplates xmlns="http://schemas.microsoft.com/sharepoint/v3/contenttype/forms">
-  <Display>DocumentLibraryForm</Display>
-  <Edit>DocumentLibraryForm</Edit>
-  <New>DocumentLibraryForm</New>
-</FormTemplates>
-</file>
-
-<file path=customXml/item3.xml><?xml version="1.0" encoding="utf-8"?>
 <ct:contentTypeSchema xmlns:ct="http://schemas.microsoft.com/office/2006/metadata/contentType" xmlns:ma="http://schemas.microsoft.com/office/2006/metadata/properties/metaAttributes" ct:_="" ma:_="" ma:contentTypeName="Document" ma:contentTypeID="0x0101001132905C37EA9847A7207C4BBCCCD8F4" ma:contentTypeVersion="13" ma:contentTypeDescription="Create a new document." ma:contentTypeScope="" ma:versionID="0fa59793b99d27e1e0b856ab72ac2f0d">
   <xsd:schema xmlns:xsd="http://www.w3.org/2001/XMLSchema" xmlns:xs="http://www.w3.org/2001/XMLSchema" xmlns:p="http://schemas.microsoft.com/office/2006/metadata/properties" xmlns:ns3="4327b14a-fe89-488e-9f6d-9658cacf372b" xmlns:ns4="bbcd8c33-6940-4d4c-a587-bbc736ca1e4d" targetNamespace="http://schemas.microsoft.com/office/2006/metadata/properties" ma:root="true" ma:fieldsID="01494effa1b4414faf4d9851fe547c93" ns3:_="" ns4:_="">
     <xsd:import namespace="4327b14a-fe89-488e-9f6d-9658cacf372b"/>
@@ -25842,32 +25823,22 @@
 </ct:contentTypeSchema>
 </file>
 
-<file path=customXml/itemProps1.xml><?xml version="1.0" encoding="utf-8"?>
-<ds:datastoreItem xmlns:ds="http://schemas.openxmlformats.org/officeDocument/2006/customXml" ds:itemID="{30D3F7B2-E865-49C4-B6C4-1C3489F322E5}">
-  <ds:schemaRefs>
-    <ds:schemaRef ds:uri="http://purl.org/dc/terms/"/>
-    <ds:schemaRef ds:uri="http://schemas.microsoft.com/office/2006/metadata/properties"/>
-    <ds:schemaRef ds:uri="4327b14a-fe89-488e-9f6d-9658cacf372b"/>
-    <ds:schemaRef ds:uri="http://purl.org/dc/dcmitype/"/>
-    <ds:schemaRef ds:uri="http://schemas.microsoft.com/office/infopath/2007/PartnerControls"/>
-    <ds:schemaRef ds:uri="http://schemas.microsoft.com/office/2006/documentManagement/types"/>
-    <ds:schemaRef ds:uri="http://purl.org/dc/elements/1.1/"/>
-    <ds:schemaRef ds:uri="http://schemas.openxmlformats.org/package/2006/metadata/core-properties"/>
-    <ds:schemaRef ds:uri="bbcd8c33-6940-4d4c-a587-bbc736ca1e4d"/>
-    <ds:schemaRef ds:uri="http://www.w3.org/XML/1998/namespace"/>
-  </ds:schemaRefs>
-</ds:datastoreItem>
+<file path=customXml/item2.xml><?xml version="1.0" encoding="utf-8"?>
+<?mso-contentType ?>
+<FormTemplates xmlns="http://schemas.microsoft.com/sharepoint/v3/contenttype/forms">
+  <Display>DocumentLibraryForm</Display>
+  <Edit>DocumentLibraryForm</Edit>
+  <New>DocumentLibraryForm</New>
+</FormTemplates>
 </file>
 
-<file path=customXml/itemProps2.xml><?xml version="1.0" encoding="utf-8"?>
-<ds:datastoreItem xmlns:ds="http://schemas.openxmlformats.org/officeDocument/2006/customXml" ds:itemID="{B2402960-8EF3-4234-B7C9-25E125FD4CA5}">
-  <ds:schemaRefs>
-    <ds:schemaRef ds:uri="http://schemas.microsoft.com/sharepoint/v3/contenttype/forms"/>
-  </ds:schemaRefs>
-</ds:datastoreItem>
+<file path=customXml/item3.xml><?xml version="1.0" encoding="utf-8"?>
+<p:properties xmlns:p="http://schemas.microsoft.com/office/2006/metadata/properties" xmlns:xsi="http://www.w3.org/2001/XMLSchema-instance" xmlns:pc="http://schemas.microsoft.com/office/infopath/2007/PartnerControls">
+  <documentManagement/>
+</p:properties>
 </file>
 
-<file path=customXml/itemProps3.xml><?xml version="1.0" encoding="utf-8"?>
+<file path=customXml/itemProps1.xml><?xml version="1.0" encoding="utf-8"?>
 <ds:datastoreItem xmlns:ds="http://schemas.openxmlformats.org/officeDocument/2006/customXml" ds:itemID="{5B58B9C8-0155-43AB-B381-4C0241D252D3}">
   <ds:schemaRefs>
     <ds:schemaRef ds:uri="http://schemas.microsoft.com/office/2006/metadata/contentType"/>
@@ -25884,4 +25855,29 @@
     <ds:schemaRef ds:uri="http://schemas.microsoft.com/internal/obd"/>
   </ds:schemaRefs>
 </ds:datastoreItem>
+</file>
+
+<file path=customXml/itemProps2.xml><?xml version="1.0" encoding="utf-8"?>
+<ds:datastoreItem xmlns:ds="http://schemas.openxmlformats.org/officeDocument/2006/customXml" ds:itemID="{B2402960-8EF3-4234-B7C9-25E125FD4CA5}">
+  <ds:schemaRefs>
+    <ds:schemaRef ds:uri="http://schemas.microsoft.com/sharepoint/v3/contenttype/forms"/>
+  </ds:schemaRefs>
+</ds:datastoreItem>
+</file>
+
+<file path=customXml/itemProps3.xml><?xml version="1.0" encoding="utf-8"?>
+<ds:datastoreItem xmlns:ds="http://schemas.openxmlformats.org/officeDocument/2006/customXml" ds:itemID="{30D3F7B2-E865-49C4-B6C4-1C3489F322E5}">
+  <ds:schemaRefs>
+    <ds:schemaRef ds:uri="http://purl.org/dc/elements/1.1/"/>
+    <ds:schemaRef ds:uri="http://purl.org/dc/terms/"/>
+    <ds:schemaRef ds:uri="http://schemas.microsoft.com/office/2006/documentManagement/types"/>
+    <ds:schemaRef ds:uri="http://www.w3.org/XML/1998/namespace"/>
+    <ds:schemaRef ds:uri="http://schemas.openxmlformats.org/package/2006/metadata/core-properties"/>
+    <ds:schemaRef ds:uri="http://schemas.microsoft.com/office/2006/metadata/properties"/>
+    <ds:schemaRef ds:uri="http://purl.org/dc/dcmitype/"/>
+    <ds:schemaRef ds:uri="http://schemas.microsoft.com/office/infopath/2007/PartnerControls"/>
+    <ds:schemaRef ds:uri="bbcd8c33-6940-4d4c-a587-bbc736ca1e4d"/>
+    <ds:schemaRef ds:uri="4327b14a-fe89-488e-9f6d-9658cacf372b"/>
+  </ds:schemaRefs>
+</ds:datastoreItem>
 </file>
</xml_diff>